<commit_message>
Huffman completo e corrigido, com ponteiros genéricos e documentado.
</commit_message>
<xml_diff>
--- a/04 - Plotagem/Plotagem.pptx
+++ b/04 - Plotagem/Plotagem.pptx
@@ -668,6 +668,45 @@
       </pc:sldChg>
     </pc:docChg>
   </pc:docChgLst>
+  <pc:docChgLst>
+    <pc:chgData name="João Felipe Brandão Jatobá" userId="1727debee8632b95" providerId="LiveId" clId="{632967B9-7E6F-474C-8587-0794140C649F}"/>
+    <pc:docChg chg="modSld">
+      <pc:chgData name="João Felipe Brandão Jatobá" userId="1727debee8632b95" providerId="LiveId" clId="{632967B9-7E6F-474C-8587-0794140C649F}" dt="2025-05-01T23:27:34.059" v="59" actId="20577"/>
+      <pc:docMkLst>
+        <pc:docMk/>
+      </pc:docMkLst>
+      <pc:sldChg chg="modSp mod">
+        <pc:chgData name="João Felipe Brandão Jatobá" userId="1727debee8632b95" providerId="LiveId" clId="{632967B9-7E6F-474C-8587-0794140C649F}" dt="2025-05-01T23:27:34.059" v="59" actId="20577"/>
+        <pc:sldMkLst>
+          <pc:docMk/>
+          <pc:sldMk cId="3486154733" sldId="263"/>
+        </pc:sldMkLst>
+        <pc:spChg chg="mod">
+          <ac:chgData name="João Felipe Brandão Jatobá" userId="1727debee8632b95" providerId="LiveId" clId="{632967B9-7E6F-474C-8587-0794140C649F}" dt="2025-05-01T23:27:34.059" v="59" actId="20577"/>
+          <ac:spMkLst>
+            <pc:docMk/>
+            <pc:sldMk cId="3486154733" sldId="263"/>
+            <ac:spMk id="3" creationId="{E0F1BE2B-3578-3087-5286-7146F8C5CA99}"/>
+          </ac:spMkLst>
+        </pc:spChg>
+      </pc:sldChg>
+      <pc:sldChg chg="modSp mod">
+        <pc:chgData name="João Felipe Brandão Jatobá" userId="1727debee8632b95" providerId="LiveId" clId="{632967B9-7E6F-474C-8587-0794140C649F}" dt="2025-05-01T23:26:09.323" v="21" actId="113"/>
+        <pc:sldMkLst>
+          <pc:docMk/>
+          <pc:sldMk cId="328574285" sldId="275"/>
+        </pc:sldMkLst>
+        <pc:spChg chg="mod">
+          <ac:chgData name="João Felipe Brandão Jatobá" userId="1727debee8632b95" providerId="LiveId" clId="{632967B9-7E6F-474C-8587-0794140C649F}" dt="2025-05-01T23:26:09.323" v="21" actId="113"/>
+          <ac:spMkLst>
+            <pc:docMk/>
+            <pc:sldMk cId="328574285" sldId="275"/>
+            <ac:spMk id="5" creationId="{EE85C52E-0980-6750-AF39-1C23F0E7ABD3}"/>
+          </ac:spMkLst>
+        </pc:spChg>
+      </pc:sldChg>
+    </pc:docChg>
+  </pc:docChgLst>
 </pc:chgInfo>
 </file>
 
@@ -4269,6 +4308,15 @@
               <a:t>Dados Lineares</a:t>
             </a:r>
           </a:p>
+          <a:p>
+            <a:endParaRPr lang="pt-BR" dirty="0"/>
+          </a:p>
+          <a:p>
+            <a:r>
+              <a:rPr lang="pt-BR" dirty="0"/>
+              <a:t>Exemplo de DEGENERAÇÃO</a:t>
+            </a:r>
+          </a:p>
         </p:txBody>
       </p:sp>
     </p:spTree>
@@ -5365,7 +5413,17 @@
                 <a:latin typeface="Helvetica" panose="020B0604020202020204" pitchFamily="34" charset="0"/>
                 <a:cs typeface="Helvetica" panose="020B0604020202020204" pitchFamily="34" charset="0"/>
               </a:rPr>
-              <a:t>O(log n).</a:t>
+              <a:t>O(log n)</a:t>
+            </a:r>
+            <a:r>
+              <a:rPr lang="pt-BR" dirty="0">
+                <a:solidFill>
+                  <a:schemeClr val="tx1"/>
+                </a:solidFill>
+                <a:latin typeface="Helvetica" panose="020B0604020202020204" pitchFamily="34" charset="0"/>
+                <a:cs typeface="Helvetica" panose="020B0604020202020204" pitchFamily="34" charset="0"/>
+              </a:rPr>
+              <a:t>, sendo a AVL melhor.</a:t>
             </a:r>
           </a:p>
         </p:txBody>

</xml_diff>